<commit_message>
Update requirements to relate to worked examples
</commit_message>
<xml_diff>
--- a/PRESENTATIONS/2024-09-tpac/2024-09-26-WoT-TPAC-Requirements-McCool.pptx
+++ b/PRESENTATIONS/2024-09-tpac/2024-09-26-WoT-TPAC-Requirements-McCool.pptx
@@ -6,7 +6,7 @@
     <p:sldMasterId id="2147483660" r:id="rId2"/>
   </p:sldMasterIdLst>
   <p:notesMasterIdLst>
-    <p:notesMasterId r:id="rId14"/>
+    <p:notesMasterId r:id="rId15"/>
   </p:notesMasterIdLst>
   <p:sldIdLst>
     <p:sldId id="256" r:id="rId3"/>
@@ -14,12 +14,13 @@
     <p:sldId id="258" r:id="rId5"/>
     <p:sldId id="265" r:id="rId6"/>
     <p:sldId id="267" r:id="rId7"/>
-    <p:sldId id="266" r:id="rId8"/>
-    <p:sldId id="259" r:id="rId9"/>
-    <p:sldId id="260" r:id="rId10"/>
-    <p:sldId id="261" r:id="rId11"/>
-    <p:sldId id="263" r:id="rId12"/>
-    <p:sldId id="268" r:id="rId13"/>
+    <p:sldId id="269" r:id="rId8"/>
+    <p:sldId id="266" r:id="rId9"/>
+    <p:sldId id="259" r:id="rId10"/>
+    <p:sldId id="260" r:id="rId11"/>
+    <p:sldId id="261" r:id="rId12"/>
+    <p:sldId id="263" r:id="rId13"/>
+    <p:sldId id="268" r:id="rId14"/>
   </p:sldIdLst>
   <p:sldSz cx="12192000" cy="6858000"/>
   <p:notesSz cx="6858000" cy="9144000"/>
@@ -140,13 +141,143 @@
 <file path=ppt/revisionInfo.xml><?xml version="1.0" encoding="utf-8"?>
 <p1510:revInfo xmlns:a="http://schemas.openxmlformats.org/drawingml/2006/main" xmlns:r="http://schemas.openxmlformats.org/officeDocument/2006/relationships" xmlns:p1510="http://schemas.microsoft.com/office/powerpoint/2015/10/main">
   <p1510:revLst>
-    <p1510:client id="{78447CC0-1FD6-47D4-9961-0D4689A63AD3}" v="1" dt="2024-09-09T16:37:40.100"/>
+    <p1510:client id="{B047534C-F182-47FE-B794-26175C9397E7}" v="2" dt="2024-09-25T13:22:47.960"/>
   </p1510:revLst>
 </p1510:revInfo>
 </file>
 
 <file path=ppt/changesInfos/changesInfo1.xml><?xml version="1.0" encoding="utf-8"?>
 <pc:chgInfo xmlns:a="http://schemas.openxmlformats.org/drawingml/2006/main" xmlns:r="http://schemas.openxmlformats.org/officeDocument/2006/relationships" xmlns:ac="http://schemas.microsoft.com/office/drawing/2013/main/command" xmlns:pc="http://schemas.microsoft.com/office/powerpoint/2013/main/command">
+  <pc:docChgLst>
+    <pc:chgData name="Mccool, Michael" userId="9022b910-48f5-4b36-ad75-783e2c5f7356" providerId="ADAL" clId="{B047534C-F182-47FE-B794-26175C9397E7}"/>
+    <pc:docChg chg="custSel modSld sldOrd">
+      <pc:chgData name="Mccool, Michael" userId="9022b910-48f5-4b36-ad75-783e2c5f7356" providerId="ADAL" clId="{B047534C-F182-47FE-B794-26175C9397E7}" dt="2024-09-25T13:30:16.385" v="1505" actId="20577"/>
+      <pc:docMkLst>
+        <pc:docMk/>
+      </pc:docMkLst>
+      <pc:sldChg chg="modSp mod">
+        <pc:chgData name="Mccool, Michael" userId="9022b910-48f5-4b36-ad75-783e2c5f7356" providerId="ADAL" clId="{B047534C-F182-47FE-B794-26175C9397E7}" dt="2024-09-25T13:26:49.351" v="1073" actId="20577"/>
+        <pc:sldMkLst>
+          <pc:docMk/>
+          <pc:sldMk cId="868142888" sldId="260"/>
+        </pc:sldMkLst>
+        <pc:spChg chg="mod">
+          <ac:chgData name="Mccool, Michael" userId="9022b910-48f5-4b36-ad75-783e2c5f7356" providerId="ADAL" clId="{B047534C-F182-47FE-B794-26175C9397E7}" dt="2024-09-25T13:26:49.351" v="1073" actId="20577"/>
+          <ac:spMkLst>
+            <pc:docMk/>
+            <pc:sldMk cId="868142888" sldId="260"/>
+            <ac:spMk id="3" creationId="{F54CD475-00EA-85CF-318A-DD9C80F09357}"/>
+          </ac:spMkLst>
+        </pc:spChg>
+      </pc:sldChg>
+      <pc:sldChg chg="modSp mod">
+        <pc:chgData name="Mccool, Michael" userId="9022b910-48f5-4b36-ad75-783e2c5f7356" providerId="ADAL" clId="{B047534C-F182-47FE-B794-26175C9397E7}" dt="2024-09-25T13:28:11.077" v="1287" actId="20577"/>
+        <pc:sldMkLst>
+          <pc:docMk/>
+          <pc:sldMk cId="1516491476" sldId="261"/>
+        </pc:sldMkLst>
+        <pc:spChg chg="mod">
+          <ac:chgData name="Mccool, Michael" userId="9022b910-48f5-4b36-ad75-783e2c5f7356" providerId="ADAL" clId="{B047534C-F182-47FE-B794-26175C9397E7}" dt="2024-09-25T13:28:11.077" v="1287" actId="20577"/>
+          <ac:spMkLst>
+            <pc:docMk/>
+            <pc:sldMk cId="1516491476" sldId="261"/>
+            <ac:spMk id="3" creationId="{E1C9EC77-521A-A3BD-492F-9365062B6645}"/>
+          </ac:spMkLst>
+        </pc:spChg>
+      </pc:sldChg>
+      <pc:sldChg chg="modSp mod">
+        <pc:chgData name="Mccool, Michael" userId="9022b910-48f5-4b36-ad75-783e2c5f7356" providerId="ADAL" clId="{B047534C-F182-47FE-B794-26175C9397E7}" dt="2024-09-25T13:30:16.385" v="1505" actId="20577"/>
+        <pc:sldMkLst>
+          <pc:docMk/>
+          <pc:sldMk cId="946746563" sldId="263"/>
+        </pc:sldMkLst>
+        <pc:spChg chg="mod">
+          <ac:chgData name="Mccool, Michael" userId="9022b910-48f5-4b36-ad75-783e2c5f7356" providerId="ADAL" clId="{B047534C-F182-47FE-B794-26175C9397E7}" dt="2024-09-25T13:30:16.385" v="1505" actId="20577"/>
+          <ac:spMkLst>
+            <pc:docMk/>
+            <pc:sldMk cId="946746563" sldId="263"/>
+            <ac:spMk id="3" creationId="{7F0EBC67-8742-919E-17D8-C6F2A6E96979}"/>
+          </ac:spMkLst>
+        </pc:spChg>
+      </pc:sldChg>
+      <pc:sldChg chg="modSp mod">
+        <pc:chgData name="Mccool, Michael" userId="9022b910-48f5-4b36-ad75-783e2c5f7356" providerId="ADAL" clId="{B047534C-F182-47FE-B794-26175C9397E7}" dt="2024-09-25T13:08:09.540" v="226" actId="20577"/>
+        <pc:sldMkLst>
+          <pc:docMk/>
+          <pc:sldMk cId="2251823845" sldId="265"/>
+        </pc:sldMkLst>
+        <pc:spChg chg="mod">
+          <ac:chgData name="Mccool, Michael" userId="9022b910-48f5-4b36-ad75-783e2c5f7356" providerId="ADAL" clId="{B047534C-F182-47FE-B794-26175C9397E7}" dt="2024-09-25T13:08:09.540" v="226" actId="20577"/>
+          <ac:spMkLst>
+            <pc:docMk/>
+            <pc:sldMk cId="2251823845" sldId="265"/>
+            <ac:spMk id="3" creationId="{D013F29C-27EF-B00F-BC36-D2551C84A203}"/>
+          </ac:spMkLst>
+        </pc:spChg>
+      </pc:sldChg>
+      <pc:sldChg chg="modSp mod">
+        <pc:chgData name="Mccool, Michael" userId="9022b910-48f5-4b36-ad75-783e2c5f7356" providerId="ADAL" clId="{B047534C-F182-47FE-B794-26175C9397E7}" dt="2024-09-25T13:23:11.613" v="912" actId="20577"/>
+        <pc:sldMkLst>
+          <pc:docMk/>
+          <pc:sldMk cId="2351600870" sldId="266"/>
+        </pc:sldMkLst>
+        <pc:spChg chg="mod">
+          <ac:chgData name="Mccool, Michael" userId="9022b910-48f5-4b36-ad75-783e2c5f7356" providerId="ADAL" clId="{B047534C-F182-47FE-B794-26175C9397E7}" dt="2024-09-25T13:23:11.613" v="912" actId="20577"/>
+          <ac:spMkLst>
+            <pc:docMk/>
+            <pc:sldMk cId="2351600870" sldId="266"/>
+            <ac:spMk id="2" creationId="{769E973D-CE91-F537-C36E-42E63A38EE3B}"/>
+          </ac:spMkLst>
+        </pc:spChg>
+        <pc:spChg chg="mod">
+          <ac:chgData name="Mccool, Michael" userId="9022b910-48f5-4b36-ad75-783e2c5f7356" providerId="ADAL" clId="{B047534C-F182-47FE-B794-26175C9397E7}" dt="2024-09-25T13:23:04.422" v="909" actId="20577"/>
+          <ac:spMkLst>
+            <pc:docMk/>
+            <pc:sldMk cId="2351600870" sldId="266"/>
+            <ac:spMk id="3" creationId="{D013F29C-27EF-B00F-BC36-D2551C84A203}"/>
+          </ac:spMkLst>
+        </pc:spChg>
+      </pc:sldChg>
+      <pc:sldChg chg="modSp mod">
+        <pc:chgData name="Mccool, Michael" userId="9022b910-48f5-4b36-ad75-783e2c5f7356" providerId="ADAL" clId="{B047534C-F182-47FE-B794-26175C9397E7}" dt="2024-09-25T13:25:31.142" v="1028" actId="313"/>
+        <pc:sldMkLst>
+          <pc:docMk/>
+          <pc:sldMk cId="1689043559" sldId="267"/>
+        </pc:sldMkLst>
+        <pc:spChg chg="mod">
+          <ac:chgData name="Mccool, Michael" userId="9022b910-48f5-4b36-ad75-783e2c5f7356" providerId="ADAL" clId="{B047534C-F182-47FE-B794-26175C9397E7}" dt="2024-09-25T13:23:33.137" v="918" actId="20577"/>
+          <ac:spMkLst>
+            <pc:docMk/>
+            <pc:sldMk cId="1689043559" sldId="267"/>
+            <ac:spMk id="2" creationId="{A7EC807C-20BE-39AE-00D3-0D562B7BF99C}"/>
+          </ac:spMkLst>
+        </pc:spChg>
+        <pc:spChg chg="mod">
+          <ac:chgData name="Mccool, Michael" userId="9022b910-48f5-4b36-ad75-783e2c5f7356" providerId="ADAL" clId="{B047534C-F182-47FE-B794-26175C9397E7}" dt="2024-09-25T13:25:31.142" v="1028" actId="313"/>
+          <ac:spMkLst>
+            <pc:docMk/>
+            <pc:sldMk cId="1689043559" sldId="267"/>
+            <ac:spMk id="3" creationId="{8B9A6113-0237-4E2D-4853-929D9ED9E514}"/>
+          </ac:spMkLst>
+        </pc:spChg>
+      </pc:sldChg>
+      <pc:sldChg chg="modSp mod ord">
+        <pc:chgData name="Mccool, Michael" userId="9022b910-48f5-4b36-ad75-783e2c5f7356" providerId="ADAL" clId="{B047534C-F182-47FE-B794-26175C9397E7}" dt="2024-09-25T13:23:20.994" v="917"/>
+        <pc:sldMkLst>
+          <pc:docMk/>
+          <pc:sldMk cId="1388342694" sldId="269"/>
+        </pc:sldMkLst>
+        <pc:spChg chg="mod">
+          <ac:chgData name="Mccool, Michael" userId="9022b910-48f5-4b36-ad75-783e2c5f7356" providerId="ADAL" clId="{B047534C-F182-47FE-B794-26175C9397E7}" dt="2024-09-25T13:23:16.566" v="915" actId="20577"/>
+          <ac:spMkLst>
+            <pc:docMk/>
+            <pc:sldMk cId="1388342694" sldId="269"/>
+            <ac:spMk id="2" creationId="{769E973D-CE91-F537-C36E-42E63A38EE3B}"/>
+          </ac:spMkLst>
+        </pc:spChg>
+      </pc:sldChg>
+    </pc:docChg>
+  </pc:docChgLst>
   <pc:docChgLst>
     <pc:chgData name="Mccool, Michael" userId="9022b910-48f5-4b36-ad75-783e2c5f7356" providerId="ADAL" clId="{78447CC0-1FD6-47D4-9961-0D4689A63AD3}"/>
     <pc:docChg chg="custSel modSld">
@@ -271,7 +402,7 @@
           <a:p>
             <a:fld id="{8389B5DD-0274-BF45-B4C5-62E173E8F634}" type="datetimeFigureOut">
               <a:rPr lang="en-US" smtClean="0"/>
-              <a:t>9/11/2024</a:t>
+              <a:t>9/25/2024</a:t>
             </a:fld>
             <a:endParaRPr lang="en-US"/>
           </a:p>
@@ -887,7 +1018,7 @@
           <a:p>
             <a:fld id="{2F93E591-CC8D-C74E-8EED-098A7FB5E64D}" type="datetime1">
               <a:rPr lang="en-CA" smtClean="0"/>
-              <a:t>2024-09-11</a:t>
+              <a:t>2024-09-25</a:t>
             </a:fld>
             <a:endParaRPr lang="en-US"/>
           </a:p>
@@ -1155,7 +1286,7 @@
           <a:p>
             <a:fld id="{2E1BC118-574D-594E-ABEA-A7C82666C9AB}" type="datetime1">
               <a:rPr lang="en-CA" smtClean="0"/>
-              <a:t>2024-09-11</a:t>
+              <a:t>2024-09-25</a:t>
             </a:fld>
             <a:endParaRPr lang="en-US"/>
           </a:p>
@@ -1521,7 +1652,7 @@
           <a:p>
             <a:fld id="{B929AB1E-7FD9-0A40-B7C0-508CCACB3E9A}" type="datetime1">
               <a:rPr lang="en-CA" smtClean="0"/>
-              <a:t>2024-09-11</a:t>
+              <a:t>2024-09-25</a:t>
             </a:fld>
             <a:endParaRPr lang="en-US"/>
           </a:p>
@@ -1784,7 +1915,7 @@
           <a:p>
             <a:fld id="{B929AB1E-7FD9-0A40-B7C0-508CCACB3E9A}" type="datetime1">
               <a:rPr lang="en-CA" smtClean="0"/>
-              <a:t>2024-09-11</a:t>
+              <a:t>2024-09-25</a:t>
             </a:fld>
             <a:endParaRPr lang="en-US"/>
           </a:p>
@@ -2016,7 +2147,7 @@
           <a:p>
             <a:fld id="{5AE8723F-57EA-4C47-97B9-92AFDEEF85DC}" type="datetime1">
               <a:rPr lang="en-CA" smtClean="0"/>
-              <a:t>2024-09-11</a:t>
+              <a:t>2024-09-25</a:t>
             </a:fld>
             <a:endParaRPr lang="en-US"/>
           </a:p>
@@ -2346,7 +2477,7 @@
           <a:p>
             <a:fld id="{B2B00E5D-EC04-AA49-8D52-0FCB6E08F63D}" type="datetime1">
               <a:rPr lang="en-CA" smtClean="0"/>
-              <a:t>2024-09-11</a:t>
+              <a:t>2024-09-25</a:t>
             </a:fld>
             <a:endParaRPr lang="en-US"/>
           </a:p>
@@ -2819,7 +2950,7 @@
           <a:p>
             <a:fld id="{FF90905C-10FF-8047-AA7E-6DC7E8B6AF51}" type="datetime1">
               <a:rPr lang="en-CA" smtClean="0"/>
-              <a:t>2024-09-11</a:t>
+              <a:t>2024-09-25</a:t>
             </a:fld>
             <a:endParaRPr lang="en-US"/>
           </a:p>
@@ -3025,7 +3156,7 @@
           <a:p>
             <a:fld id="{D1CE86E2-4400-D342-BEEC-F9C1ADF6F9F7}" type="datetime1">
               <a:rPr lang="en-CA" smtClean="0"/>
-              <a:t>2024-09-11</a:t>
+              <a:t>2024-09-25</a:t>
             </a:fld>
             <a:endParaRPr lang="en-US"/>
           </a:p>
@@ -3195,7 +3326,7 @@
           <a:p>
             <a:fld id="{74358A08-7221-7F45-8378-69D5559861DD}" type="datetime1">
               <a:rPr lang="en-CA" smtClean="0"/>
-              <a:t>2024-09-11</a:t>
+              <a:t>2024-09-25</a:t>
             </a:fld>
             <a:endParaRPr lang="en-US"/>
           </a:p>
@@ -3567,7 +3698,7 @@
           <a:p>
             <a:fld id="{08C20FDB-303D-8A4E-83B7-226DD88B97BD}" type="datetime1">
               <a:rPr lang="en-CA" smtClean="0"/>
-              <a:t>2024-09-11</a:t>
+              <a:t>2024-09-25</a:t>
             </a:fld>
             <a:endParaRPr lang="en-US"/>
           </a:p>
@@ -3919,7 +4050,7 @@
           <a:p>
             <a:fld id="{0A9EBA37-9D18-D34A-A88D-1B00AA06E95C}" type="datetime1">
               <a:rPr lang="en-CA" smtClean="0"/>
-              <a:t>2024-09-11</a:t>
+              <a:t>2024-09-25</a:t>
             </a:fld>
             <a:endParaRPr lang="en-US"/>
           </a:p>
@@ -4259,7 +4390,7 @@
             <a:fld id="{B73A2E78-F38A-E046-ACDB-668F070D1EF6}" type="datetime1">
               <a:rPr lang="en-CA" smtClean="0"/>
               <a:pPr/>
-              <a:t>2024-09-11</a:t>
+              <a:t>2024-09-25</a:t>
             </a:fld>
             <a:endParaRPr lang="en-US" dirty="0"/>
           </a:p>
@@ -4837,7 +4968,7 @@
             <a:fld id="{B73A2E78-F38A-E046-ACDB-668F070D1EF6}" type="datetime1">
               <a:rPr lang="en-CA" smtClean="0"/>
               <a:pPr/>
-              <a:t>2024-09-11</a:t>
+              <a:t>2024-09-25</a:t>
             </a:fld>
             <a:endParaRPr lang="en-US" dirty="0"/>
           </a:p>
@@ -5347,7 +5478,7 @@
           <p:cNvPr id="2" name="Title 1">
             <a:extLst>
               <a:ext uri="{FF2B5EF4-FFF2-40B4-BE49-F238E27FC236}">
-                <a16:creationId xmlns:a16="http://schemas.microsoft.com/office/drawing/2014/main" id="{0F5849BF-AC29-3257-C464-2CADC02E3F3F}"/>
+                <a16:creationId xmlns:a16="http://schemas.microsoft.com/office/drawing/2014/main" id="{F6BE134B-66C4-1D89-1049-4EF2CFB07ED3}"/>
               </a:ext>
             </a:extLst>
           </p:cNvPr>
@@ -5365,7 +5496,7 @@
           <a:p>
             <a:r>
               <a:rPr lang="en-US" dirty="0"/>
-              <a:t>Suggested Plan</a:t>
+              <a:t>Security and Privacy Requirements</a:t>
             </a:r>
           </a:p>
         </p:txBody>
@@ -5375,7 +5506,7 @@
           <p:cNvPr id="3" name="Content Placeholder 2">
             <a:extLst>
               <a:ext uri="{FF2B5EF4-FFF2-40B4-BE49-F238E27FC236}">
-                <a16:creationId xmlns:a16="http://schemas.microsoft.com/office/drawing/2014/main" id="{7F0EBC67-8742-919E-17D8-C6F2A6E96979}"/>
+                <a16:creationId xmlns:a16="http://schemas.microsoft.com/office/drawing/2014/main" id="{E1C9EC77-521A-A3BD-492F-9365062B6645}"/>
               </a:ext>
             </a:extLst>
           </p:cNvPr>
@@ -5388,114 +5519,61 @@
         </p:nvSpPr>
         <p:spPr/>
         <p:txBody>
-          <a:bodyPr>
-            <a:normAutofit fontScale="92500" lnSpcReduction="20000"/>
-          </a:bodyPr>
-          <a:lstStyle/>
+          <a:bodyPr/>
+          <a:lstStyle/>
+          <a:p>
+            <a:pPr marL="0" indent="0">
+              <a:buNone/>
+            </a:pPr>
+            <a:r>
+              <a:rPr lang="en-US" b="1" dirty="0"/>
+              <a:t>Special case:</a:t>
+            </a:r>
+          </a:p>
           <a:p>
             <a:r>
               <a:rPr lang="en-US" dirty="0"/>
-              <a:t>Expand “Requirements” Section in Use Cases and Requirements document to define requirements and connect them to use cases.</a:t>
+              <a:t>Security/Privacy features are generally to mitigate “risks”</a:t>
             </a:r>
           </a:p>
           <a:p>
             <a:pPr lvl="1"/>
             <a:r>
               <a:rPr lang="en-US" dirty="0"/>
-              <a:t>Want to avoid editing use cases themselves for authorship and consolidation reasons</a:t>
+              <a:t>S&amp;P sections generally each have a defined risk</a:t>
             </a:r>
           </a:p>
           <a:p>
             <a:pPr lvl="1"/>
             <a:r>
               <a:rPr lang="en-US" dirty="0"/>
-              <a:t>Consolidate: move requirements out of other documents, e.g. Architecture</a:t>
-            </a:r>
-          </a:p>
-          <a:p>
+              <a:t>… then list mitigations for each risk, some of which may be normative</a:t>
+            </a:r>
+          </a:p>
+          <a:p>
+            <a:pPr lvl="1"/>
             <a:r>
               <a:rPr lang="en-US" dirty="0"/>
-              <a:t>Keep it simple: </a:t>
+              <a:t>In general, mitigations map to capabilities and avoiding risks are purposes</a:t>
+            </a:r>
+          </a:p>
+          <a:p>
+            <a:r>
+              <a:rPr lang="en-US" dirty="0"/>
+              <a:t>Risks are documented in “Security and Privacy Guidelines” document</a:t>
             </a:r>
           </a:p>
           <a:p>
             <a:pPr lvl="1"/>
             <a:r>
               <a:rPr lang="en-US" dirty="0"/>
-              <a:t>A named requirement and a user story defining each one is enough. </a:t>
-            </a:r>
-          </a:p>
-          <a:p>
-            <a:pPr lvl="2"/>
-            <a:r>
-              <a:rPr lang="en-US" dirty="0"/>
-              <a:t>Optionally can have </a:t>
-            </a:r>
-            <a:r>
-              <a:rPr lang="en-US"/>
-              <a:t>additional description paragraph </a:t>
-            </a:r>
-            <a:endParaRPr lang="en-US" dirty="0"/>
-          </a:p>
-          <a:p>
-            <a:pPr lvl="1"/>
-            <a:r>
-              <a:rPr lang="en-US" dirty="0"/>
-              <a:t>Can link to another document for more detailed definitions, e.g. security risks.</a:t>
-            </a:r>
-          </a:p>
-          <a:p>
-            <a:pPr lvl="2"/>
-            <a:r>
-              <a:rPr lang="en-US" dirty="0"/>
-              <a:t>However, best IMO if any liked details are in a “published” document, not a random MD file somewhere…</a:t>
-            </a:r>
-          </a:p>
-          <a:p>
-            <a:pPr lvl="1"/>
-            <a:r>
-              <a:rPr lang="en-US" dirty="0"/>
-              <a:t>Links to use cases motivating each requirement</a:t>
-            </a:r>
-          </a:p>
-          <a:p>
-            <a:pPr lvl="1"/>
-            <a:r>
-              <a:rPr lang="en-US" dirty="0"/>
-              <a:t>Do not have to link each requirement to ALL use cases motivating it</a:t>
-            </a:r>
-          </a:p>
-          <a:p>
-            <a:pPr lvl="2"/>
-            <a:r>
-              <a:rPr lang="en-US" dirty="0"/>
-              <a:t>Use categories </a:t>
-            </a:r>
-            <a:r>
-              <a:rPr lang="en-US" i="1" dirty="0"/>
-              <a:t>only</a:t>
-            </a:r>
-            <a:r>
-              <a:rPr lang="en-US" dirty="0"/>
-              <a:t> if requirement motivated by large set of use cases</a:t>
-            </a:r>
-          </a:p>
-          <a:p>
-            <a:pPr lvl="1"/>
-            <a:r>
-              <a:rPr lang="en-US" b="1" dirty="0"/>
-              <a:t>Discuss: </a:t>
-            </a:r>
-            <a:r>
-              <a:rPr lang="en-US" dirty="0"/>
-              <a:t>do we want to allow “hierarchies” of requirements?  </a:t>
-            </a:r>
-          </a:p>
-          <a:p>
-            <a:pPr lvl="2"/>
-            <a:r>
-              <a:rPr lang="en-US" dirty="0"/>
-              <a:t>The PURPOSE does this, partially.</a:t>
+              <a:t>Stakeholders need to be made consistent with other documents</a:t>
+            </a:r>
+          </a:p>
+          <a:p>
+            <a:r>
+              <a:rPr lang="en-US" b="1" i="1" dirty="0"/>
+              <a:t>Need to identify which use cases have which risks</a:t>
             </a:r>
           </a:p>
         </p:txBody>
@@ -5505,7 +5583,7 @@
           <p:cNvPr id="4" name="Footer Placeholder 3">
             <a:extLst>
               <a:ext uri="{FF2B5EF4-FFF2-40B4-BE49-F238E27FC236}">
-                <a16:creationId xmlns:a16="http://schemas.microsoft.com/office/drawing/2014/main" id="{AB1CC309-C96B-D3EF-4F11-81381327840A}"/>
+                <a16:creationId xmlns:a16="http://schemas.microsoft.com/office/drawing/2014/main" id="{8EC9F71E-D9A0-1887-F7E3-880607CCFD88}"/>
               </a:ext>
             </a:extLst>
           </p:cNvPr>
@@ -5533,7 +5611,7 @@
           <p:cNvPr id="5" name="Slide Number Placeholder 4">
             <a:extLst>
               <a:ext uri="{FF2B5EF4-FFF2-40B4-BE49-F238E27FC236}">
-                <a16:creationId xmlns:a16="http://schemas.microsoft.com/office/drawing/2014/main" id="{47AAB1C2-C330-271D-94DC-C8A8B47E9638}"/>
+                <a16:creationId xmlns:a16="http://schemas.microsoft.com/office/drawing/2014/main" id="{F6D66143-2605-6E52-90A1-373D4AF392EC}"/>
               </a:ext>
             </a:extLst>
           </p:cNvPr>
@@ -5562,7 +5640,7 @@
           <p:cNvPr id="6" name="Date Placeholder 5">
             <a:extLst>
               <a:ext uri="{FF2B5EF4-FFF2-40B4-BE49-F238E27FC236}">
-                <a16:creationId xmlns:a16="http://schemas.microsoft.com/office/drawing/2014/main" id="{D2E853E6-C281-22D9-611E-E690D5D0E8A9}"/>
+                <a16:creationId xmlns:a16="http://schemas.microsoft.com/office/drawing/2014/main" id="{0884D1E5-BEEA-BC78-5C89-F302C72FA45A}"/>
               </a:ext>
             </a:extLst>
           </p:cNvPr>
@@ -5588,7 +5666,7 @@
     </p:spTree>
     <p:extLst>
       <p:ext uri="{BB962C8B-B14F-4D97-AF65-F5344CB8AC3E}">
-        <p14:creationId xmlns:p14="http://schemas.microsoft.com/office/powerpoint/2010/main" val="946746563"/>
+        <p14:creationId xmlns:p14="http://schemas.microsoft.com/office/powerpoint/2010/main" val="1516491476"/>
       </p:ext>
     </p:extLst>
   </p:cSld>
@@ -5620,7 +5698,7 @@
           <p:cNvPr id="2" name="Title 1">
             <a:extLst>
               <a:ext uri="{FF2B5EF4-FFF2-40B4-BE49-F238E27FC236}">
-                <a16:creationId xmlns:a16="http://schemas.microsoft.com/office/drawing/2014/main" id="{85810A6D-1173-B005-E564-1FA04B68B225}"/>
+                <a16:creationId xmlns:a16="http://schemas.microsoft.com/office/drawing/2014/main" id="{0F5849BF-AC29-3257-C464-2CADC02E3F3F}"/>
               </a:ext>
             </a:extLst>
           </p:cNvPr>
@@ -5637,8 +5715,8 @@
           <a:lstStyle/>
           <a:p>
             <a:r>
-              <a:rPr lang="en-CA" dirty="0"/>
-              <a:t>Discussion</a:t>
+              <a:rPr lang="en-US" dirty="0"/>
+              <a:t>Suggested Plan</a:t>
             </a:r>
           </a:p>
         </p:txBody>
@@ -5648,7 +5726,7 @@
           <p:cNvPr id="3" name="Content Placeholder 2">
             <a:extLst>
               <a:ext uri="{FF2B5EF4-FFF2-40B4-BE49-F238E27FC236}">
-                <a16:creationId xmlns:a16="http://schemas.microsoft.com/office/drawing/2014/main" id="{7A577F4D-199E-8A53-CD69-5BE279ACD686}"/>
+                <a16:creationId xmlns:a16="http://schemas.microsoft.com/office/drawing/2014/main" id="{7F0EBC67-8742-919E-17D8-C6F2A6E96979}"/>
               </a:ext>
             </a:extLst>
           </p:cNvPr>
@@ -5661,10 +5739,129 @@
         </p:nvSpPr>
         <p:spPr/>
         <p:txBody>
-          <a:bodyPr/>
-          <a:lstStyle/>
-          <a:p>
-            <a:endParaRPr lang="en-CA"/>
+          <a:bodyPr>
+            <a:normAutofit fontScale="85000" lnSpcReduction="10000"/>
+          </a:bodyPr>
+          <a:lstStyle/>
+          <a:p>
+            <a:r>
+              <a:rPr lang="en-US" dirty="0"/>
+              <a:t>Expand “Requirements” Section in Use Cases and Requirements document to define requirements and connect them to use cases.</a:t>
+            </a:r>
+          </a:p>
+          <a:p>
+            <a:pPr lvl="1"/>
+            <a:r>
+              <a:rPr lang="en-US" dirty="0"/>
+              <a:t>Want to avoid editing use cases themselves for authorship and consolidation reasons</a:t>
+            </a:r>
+          </a:p>
+          <a:p>
+            <a:pPr lvl="1"/>
+            <a:r>
+              <a:rPr lang="en-US" dirty="0"/>
+              <a:t>Consolidate: move requirements out of other documents, e.g. Architecture</a:t>
+            </a:r>
+          </a:p>
+          <a:p>
+            <a:r>
+              <a:rPr lang="en-US" dirty="0"/>
+              <a:t>Keep it simple: </a:t>
+            </a:r>
+          </a:p>
+          <a:p>
+            <a:pPr lvl="1"/>
+            <a:r>
+              <a:rPr lang="en-US" dirty="0"/>
+              <a:t>A named requirement and a user story defining each one is enough. </a:t>
+            </a:r>
+          </a:p>
+          <a:p>
+            <a:pPr lvl="2"/>
+            <a:r>
+              <a:rPr lang="en-US" dirty="0"/>
+              <a:t>Optionally can have additional description paragraph </a:t>
+            </a:r>
+          </a:p>
+          <a:p>
+            <a:pPr lvl="1"/>
+            <a:r>
+              <a:rPr lang="en-US" dirty="0"/>
+              <a:t>Can link to another document for more detailed definitions, e.g. security risks.</a:t>
+            </a:r>
+          </a:p>
+          <a:p>
+            <a:pPr lvl="2"/>
+            <a:r>
+              <a:rPr lang="en-US" dirty="0"/>
+              <a:t>Ideally, linked details should be in a “published” document, not a random MD file somewhere…</a:t>
+            </a:r>
+          </a:p>
+          <a:p>
+            <a:pPr lvl="1"/>
+            <a:r>
+              <a:rPr lang="en-US" dirty="0"/>
+              <a:t>Links to use cases motivating each requirement</a:t>
+            </a:r>
+          </a:p>
+          <a:p>
+            <a:pPr lvl="1"/>
+            <a:r>
+              <a:rPr lang="en-US" dirty="0"/>
+              <a:t>Do not have to link each requirement to ALL use cases motivating it</a:t>
+            </a:r>
+          </a:p>
+          <a:p>
+            <a:pPr lvl="2"/>
+            <a:r>
+              <a:rPr lang="en-US" dirty="0"/>
+              <a:t>Use categories </a:t>
+            </a:r>
+            <a:r>
+              <a:rPr lang="en-US" i="1" dirty="0"/>
+              <a:t>only</a:t>
+            </a:r>
+            <a:r>
+              <a:rPr lang="en-US" dirty="0"/>
+              <a:t> if requirement is motivated by large set of use cases</a:t>
+            </a:r>
+          </a:p>
+          <a:p>
+            <a:pPr lvl="1"/>
+            <a:r>
+              <a:rPr lang="en-US" b="1" dirty="0"/>
+              <a:t>Discuss: </a:t>
+            </a:r>
+            <a:r>
+              <a:rPr lang="en-US" dirty="0"/>
+              <a:t>do we want to allow “hierarchies” or “sets” of requirements?  </a:t>
+            </a:r>
+          </a:p>
+          <a:p>
+            <a:pPr lvl="2"/>
+            <a:r>
+              <a:rPr lang="en-US" dirty="0"/>
+              <a:t>The PURPOSE does this, partially</a:t>
+            </a:r>
+          </a:p>
+          <a:p>
+            <a:pPr lvl="2"/>
+            <a:r>
+              <a:rPr lang="en-US" dirty="0"/>
+              <a:t>But it may still be helpful to cluster or group requirements somehow</a:t>
+            </a:r>
+          </a:p>
+          <a:p>
+            <a:pPr lvl="2"/>
+            <a:r>
+              <a:rPr lang="en-US" dirty="0"/>
+              <a:t>Can do it when and if we </a:t>
+            </a:r>
+            <a:r>
+              <a:rPr lang="en-US"/>
+              <a:t>need to…</a:t>
+            </a:r>
+            <a:endParaRPr lang="en-US" dirty="0"/>
           </a:p>
         </p:txBody>
       </p:sp>
@@ -5673,7 +5870,7 @@
           <p:cNvPr id="4" name="Footer Placeholder 3">
             <a:extLst>
               <a:ext uri="{FF2B5EF4-FFF2-40B4-BE49-F238E27FC236}">
-                <a16:creationId xmlns:a16="http://schemas.microsoft.com/office/drawing/2014/main" id="{F0163247-FC3A-0E7A-B262-3D59C7A10154}"/>
+                <a16:creationId xmlns:a16="http://schemas.microsoft.com/office/drawing/2014/main" id="{AB1CC309-C96B-D3EF-4F11-81381327840A}"/>
               </a:ext>
             </a:extLst>
           </p:cNvPr>
@@ -5701,7 +5898,7 @@
           <p:cNvPr id="5" name="Slide Number Placeholder 4">
             <a:extLst>
               <a:ext uri="{FF2B5EF4-FFF2-40B4-BE49-F238E27FC236}">
-                <a16:creationId xmlns:a16="http://schemas.microsoft.com/office/drawing/2014/main" id="{1C0916BE-0BA4-C7AF-F770-2431352203B7}"/>
+                <a16:creationId xmlns:a16="http://schemas.microsoft.com/office/drawing/2014/main" id="{47AAB1C2-C330-271D-94DC-C8A8B47E9638}"/>
               </a:ext>
             </a:extLst>
           </p:cNvPr>
@@ -5720,6 +5917,174 @@
             <a:fld id="{055BDE2E-7167-1944-9FEE-E44668D91CB6}" type="slidenum">
               <a:rPr lang="en-US" smtClean="0"/>
               <a:t>11</a:t>
+            </a:fld>
+            <a:endParaRPr lang="en-US"/>
+          </a:p>
+        </p:txBody>
+      </p:sp>
+      <p:sp>
+        <p:nvSpPr>
+          <p:cNvPr id="6" name="Date Placeholder 5">
+            <a:extLst>
+              <a:ext uri="{FF2B5EF4-FFF2-40B4-BE49-F238E27FC236}">
+                <a16:creationId xmlns:a16="http://schemas.microsoft.com/office/drawing/2014/main" id="{D2E853E6-C281-22D9-611E-E690D5D0E8A9}"/>
+              </a:ext>
+            </a:extLst>
+          </p:cNvPr>
+          <p:cNvSpPr>
+            <a:spLocks noGrp="1"/>
+          </p:cNvSpPr>
+          <p:nvPr>
+            <p:ph type="dt" sz="half" idx="10"/>
+          </p:nvPr>
+        </p:nvSpPr>
+        <p:spPr/>
+        <p:txBody>
+          <a:bodyPr/>
+          <a:lstStyle/>
+          <a:p>
+            <a:r>
+              <a:rPr lang="en-US" dirty="0"/>
+              <a:t>2024-09-26</a:t>
+            </a:r>
+          </a:p>
+        </p:txBody>
+      </p:sp>
+    </p:spTree>
+    <p:extLst>
+      <p:ext uri="{BB962C8B-B14F-4D97-AF65-F5344CB8AC3E}">
+        <p14:creationId xmlns:p14="http://schemas.microsoft.com/office/powerpoint/2010/main" val="946746563"/>
+      </p:ext>
+    </p:extLst>
+  </p:cSld>
+  <p:clrMapOvr>
+    <a:masterClrMapping/>
+  </p:clrMapOvr>
+</p:sld>
+</file>
+
+<file path=ppt/slides/slide12.xml><?xml version="1.0" encoding="utf-8"?>
+<p:sld xmlns:a="http://schemas.openxmlformats.org/drawingml/2006/main" xmlns:r="http://schemas.openxmlformats.org/officeDocument/2006/relationships" xmlns:p="http://schemas.openxmlformats.org/presentationml/2006/main">
+  <p:cSld>
+    <p:spTree>
+      <p:nvGrpSpPr>
+        <p:cNvPr id="1" name=""/>
+        <p:cNvGrpSpPr/>
+        <p:nvPr/>
+      </p:nvGrpSpPr>
+      <p:grpSpPr>
+        <a:xfrm>
+          <a:off x="0" y="0"/>
+          <a:ext cx="0" cy="0"/>
+          <a:chOff x="0" y="0"/>
+          <a:chExt cx="0" cy="0"/>
+        </a:xfrm>
+      </p:grpSpPr>
+      <p:sp>
+        <p:nvSpPr>
+          <p:cNvPr id="2" name="Title 1">
+            <a:extLst>
+              <a:ext uri="{FF2B5EF4-FFF2-40B4-BE49-F238E27FC236}">
+                <a16:creationId xmlns:a16="http://schemas.microsoft.com/office/drawing/2014/main" id="{85810A6D-1173-B005-E564-1FA04B68B225}"/>
+              </a:ext>
+            </a:extLst>
+          </p:cNvPr>
+          <p:cNvSpPr>
+            <a:spLocks noGrp="1"/>
+          </p:cNvSpPr>
+          <p:nvPr>
+            <p:ph type="title"/>
+          </p:nvPr>
+        </p:nvSpPr>
+        <p:spPr/>
+        <p:txBody>
+          <a:bodyPr/>
+          <a:lstStyle/>
+          <a:p>
+            <a:r>
+              <a:rPr lang="en-CA" dirty="0"/>
+              <a:t>Discussion</a:t>
+            </a:r>
+          </a:p>
+        </p:txBody>
+      </p:sp>
+      <p:sp>
+        <p:nvSpPr>
+          <p:cNvPr id="3" name="Content Placeholder 2">
+            <a:extLst>
+              <a:ext uri="{FF2B5EF4-FFF2-40B4-BE49-F238E27FC236}">
+                <a16:creationId xmlns:a16="http://schemas.microsoft.com/office/drawing/2014/main" id="{7A577F4D-199E-8A53-CD69-5BE279ACD686}"/>
+              </a:ext>
+            </a:extLst>
+          </p:cNvPr>
+          <p:cNvSpPr>
+            <a:spLocks noGrp="1"/>
+          </p:cNvSpPr>
+          <p:nvPr>
+            <p:ph idx="1"/>
+          </p:nvPr>
+        </p:nvSpPr>
+        <p:spPr/>
+        <p:txBody>
+          <a:bodyPr/>
+          <a:lstStyle/>
+          <a:p>
+            <a:endParaRPr lang="en-CA"/>
+          </a:p>
+        </p:txBody>
+      </p:sp>
+      <p:sp>
+        <p:nvSpPr>
+          <p:cNvPr id="4" name="Footer Placeholder 3">
+            <a:extLst>
+              <a:ext uri="{FF2B5EF4-FFF2-40B4-BE49-F238E27FC236}">
+                <a16:creationId xmlns:a16="http://schemas.microsoft.com/office/drawing/2014/main" id="{F0163247-FC3A-0E7A-B262-3D59C7A10154}"/>
+              </a:ext>
+            </a:extLst>
+          </p:cNvPr>
+          <p:cNvSpPr>
+            <a:spLocks noGrp="1"/>
+          </p:cNvSpPr>
+          <p:nvPr>
+            <p:ph type="ftr" sz="quarter" idx="11"/>
+          </p:nvPr>
+        </p:nvSpPr>
+        <p:spPr/>
+        <p:txBody>
+          <a:bodyPr/>
+          <a:lstStyle/>
+          <a:p>
+            <a:r>
+              <a:rPr lang="en-US" dirty="0"/>
+              <a:t>W3C Web of Things (WoT) WG/IG – TPAC 2024</a:t>
+            </a:r>
+          </a:p>
+        </p:txBody>
+      </p:sp>
+      <p:sp>
+        <p:nvSpPr>
+          <p:cNvPr id="5" name="Slide Number Placeholder 4">
+            <a:extLst>
+              <a:ext uri="{FF2B5EF4-FFF2-40B4-BE49-F238E27FC236}">
+                <a16:creationId xmlns:a16="http://schemas.microsoft.com/office/drawing/2014/main" id="{1C0916BE-0BA4-C7AF-F770-2431352203B7}"/>
+              </a:ext>
+            </a:extLst>
+          </p:cNvPr>
+          <p:cNvSpPr>
+            <a:spLocks noGrp="1"/>
+          </p:cNvSpPr>
+          <p:nvPr>
+            <p:ph type="sldNum" sz="quarter" idx="12"/>
+          </p:nvPr>
+        </p:nvSpPr>
+        <p:spPr/>
+        <p:txBody>
+          <a:bodyPr/>
+          <a:lstStyle/>
+          <a:p>
+            <a:fld id="{055BDE2E-7167-1944-9FEE-E44668D91CB6}" type="slidenum">
+              <a:rPr lang="en-US" smtClean="0"/>
+              <a:t>12</a:t>
             </a:fld>
             <a:endParaRPr lang="en-US"/>
           </a:p>
@@ -6941,7 +7306,7 @@
             </a:r>
             <a:r>
               <a:rPr lang="en-CA" b="1" dirty="0"/>
-              <a:t>GOAL</a:t>
+              <a:t>CAPABILITY</a:t>
             </a:r>
             <a:r>
               <a:rPr lang="en-CA" dirty="0"/>
@@ -6997,7 +7362,7 @@
             </a:pPr>
             <a:r>
               <a:rPr lang="en-CA" b="1" dirty="0"/>
-              <a:t>GOAL</a:t>
+              <a:t>CAPABILITY</a:t>
             </a:r>
             <a:r>
               <a:rPr lang="en-CA" dirty="0"/>
@@ -7195,7 +7560,7 @@
           <a:p>
             <a:r>
               <a:rPr lang="en-CA" dirty="0"/>
-              <a:t>Functional vs. Technical Requirement</a:t>
+              <a:t>Functional vs. Technical Requirements</a:t>
             </a:r>
           </a:p>
         </p:txBody>
@@ -7218,7 +7583,9 @@
         </p:nvSpPr>
         <p:spPr/>
         <p:txBody>
-          <a:bodyPr/>
+          <a:bodyPr>
+            <a:normAutofit fontScale="92500"/>
+          </a:bodyPr>
           <a:lstStyle/>
           <a:p>
             <a:pPr marL="0" indent="0">
@@ -7226,14 +7593,22 @@
             </a:pPr>
             <a:r>
               <a:rPr lang="en-CA" b="1" dirty="0"/>
-              <a:t>Functional:</a:t>
+              <a:t>Functional: </a:t>
+            </a:r>
+            <a:r>
+              <a:rPr lang="en-CA" dirty="0"/>
+              <a:t>Why</a:t>
             </a:r>
           </a:p>
           <a:p>
             <a:pPr lvl="1"/>
             <a:r>
+              <a:rPr lang="en-CA" b="1" i="1" dirty="0"/>
+              <a:t>Purpose</a:t>
+            </a:r>
+            <a:r>
               <a:rPr lang="en-CA" dirty="0"/>
-              <a:t>Requirement does not specify any particular features.</a:t>
+              <a:t> of needed functionality</a:t>
             </a:r>
           </a:p>
           <a:p>
@@ -7242,48 +7617,76 @@
             </a:pPr>
             <a:r>
               <a:rPr lang="en-CA" b="1" dirty="0"/>
-              <a:t>Technical:</a:t>
+              <a:t>Technical: </a:t>
+            </a:r>
+            <a:r>
+              <a:rPr lang="en-CA" dirty="0"/>
+              <a:t>What</a:t>
             </a:r>
           </a:p>
           <a:p>
             <a:pPr lvl="1"/>
             <a:r>
+              <a:rPr lang="en-CA" b="1" i="1" dirty="0"/>
+              <a:t>Capability</a:t>
+            </a:r>
+            <a:r>
               <a:rPr lang="en-CA" dirty="0"/>
-              <a:t>Requirement does specify a particular feature or set of features.</a:t>
-            </a:r>
-          </a:p>
-          <a:p>
-            <a:pPr marL="0" indent="0">
+              <a:t> to support needed functionality</a:t>
+            </a:r>
+          </a:p>
+          <a:p>
+            <a:pPr marL="457200" lvl="1" indent="0">
               <a:buNone/>
             </a:pPr>
             <a:endParaRPr lang="en-CA" dirty="0"/>
           </a:p>
           <a:p>
-            <a:pPr marL="0" indent="0">
-              <a:buNone/>
-            </a:pPr>
-            <a:r>
-              <a:rPr lang="en-CA" b="1" i="1" dirty="0"/>
-              <a:t>Proposal:</a:t>
-            </a:r>
-          </a:p>
-          <a:p>
             <a:r>
               <a:rPr lang="en-CA" dirty="0"/>
-              <a:t>Don’t worry too much about functional vs. technical…</a:t>
-            </a:r>
-          </a:p>
-          <a:p>
+              <a:t>Don’t need to separate functional and technical requirements</a:t>
+            </a:r>
+          </a:p>
+          <a:p>
+            <a:pPr lvl="1"/>
             <a:r>
               <a:rPr lang="en-CA" dirty="0"/>
-              <a:t>The main point is that requirements should be finitely satisfiable.</a:t>
+              <a:t>User story format includes both!</a:t>
             </a:r>
           </a:p>
           <a:p>
             <a:pPr lvl="1"/>
             <a:r>
               <a:rPr lang="en-CA" dirty="0"/>
-              <a:t>For example “WoT systems should have good security” is a bad requirement, it’s unclear when it is (or can ever be) fully satisfied.</a:t>
+              <a:t>Tends to form a natural hierarchy: many “capabilities” may support one “purpose”</a:t>
+            </a:r>
+          </a:p>
+          <a:p>
+            <a:r>
+              <a:rPr lang="en-CA" dirty="0"/>
+              <a:t>Technical requirements (capabilities) should be finitely satisfiable!</a:t>
+            </a:r>
+          </a:p>
+          <a:p>
+            <a:pPr lvl="1"/>
+            <a:r>
+              <a:rPr lang="en-CA" dirty="0"/>
+              <a:t>For example, “WoT systems should have good security” is a bad technical requirement, it’s unclear when it is (or can ever be) fully satisfied.</a:t>
+            </a:r>
+          </a:p>
+          <a:p>
+            <a:pPr lvl="1"/>
+            <a:r>
+              <a:rPr lang="en-CA" dirty="0"/>
+              <a:t>It </a:t>
+            </a:r>
+            <a:r>
+              <a:rPr lang="en-CA" i="1" dirty="0"/>
+              <a:t>may</a:t>
+            </a:r>
+            <a:r>
+              <a:rPr lang="en-CA" dirty="0"/>
+              <a:t> be acceptable as a functional requirement, although it’s still a bit vague</a:t>
             </a:r>
           </a:p>
         </p:txBody>
@@ -7426,7 +7829,7 @@
           <a:p>
             <a:r>
               <a:rPr lang="en-CA" dirty="0"/>
-              <a:t>Requirements: Examples</a:t>
+              <a:t>Requirements: Examples </a:t>
             </a:r>
           </a:p>
         </p:txBody>
@@ -7594,8 +7997,41 @@
           <a:bodyPr/>
           <a:lstStyle/>
           <a:p>
-            <a:r>
-              <a:rPr lang="en-US" dirty="0"/>
+            <a:pPr marL="0" marR="0" lvl="0" indent="0" algn="ctr" defTabSz="914400" rtl="0" eaLnBrk="1" fontAlgn="auto" latinLnBrk="0" hangingPunct="1">
+              <a:lnSpc>
+                <a:spcPct val="100000"/>
+              </a:lnSpc>
+              <a:spcBef>
+                <a:spcPts val="0"/>
+              </a:spcBef>
+              <a:spcAft>
+                <a:spcPts val="0"/>
+              </a:spcAft>
+              <a:buClrTx/>
+              <a:buSzTx/>
+              <a:buFontTx/>
+              <a:buNone/>
+              <a:tabLst/>
+              <a:defRPr/>
+            </a:pPr>
+            <a:r>
+              <a:rPr kumimoji="0" lang="en-US" sz="1200" b="0" i="0" u="none" strike="noStrike" kern="1200" cap="none" spc="0" normalizeH="0" baseline="0" noProof="0" dirty="0">
+                <a:ln>
+                  <a:noFill/>
+                </a:ln>
+                <a:solidFill>
+                  <a:prstClr val="black">
+                    <a:lumMod val="50000"/>
+                    <a:lumOff val="50000"/>
+                  </a:prstClr>
+                </a:solidFill>
+                <a:effectLst/>
+                <a:uLnTx/>
+                <a:uFillTx/>
+                <a:latin typeface="Calibri" panose="020F0502020204030204"/>
+                <a:ea typeface="+mn-ea"/>
+                <a:cs typeface="+mn-cs"/>
+              </a:rPr>
               <a:t>W3C Web of Things (WoT) WG/IG – TPAC 2024</a:t>
             </a:r>
           </a:p>
@@ -7622,11 +8058,77 @@
           <a:bodyPr/>
           <a:lstStyle/>
           <a:p>
+            <a:pPr marL="0" marR="0" lvl="0" indent="0" algn="r" defTabSz="914400" rtl="0" eaLnBrk="1" fontAlgn="auto" latinLnBrk="0" hangingPunct="1">
+              <a:lnSpc>
+                <a:spcPct val="100000"/>
+              </a:lnSpc>
+              <a:spcBef>
+                <a:spcPts val="0"/>
+              </a:spcBef>
+              <a:spcAft>
+                <a:spcPts val="0"/>
+              </a:spcAft>
+              <a:buClrTx/>
+              <a:buSzTx/>
+              <a:buFontTx/>
+              <a:buNone/>
+              <a:tabLst/>
+              <a:defRPr/>
+            </a:pPr>
             <a:fld id="{055BDE2E-7167-1944-9FEE-E44668D91CB6}" type="slidenum">
-              <a:rPr lang="en-US" smtClean="0"/>
+              <a:rPr kumimoji="0" lang="en-US" sz="1800" b="0" i="0" u="none" strike="noStrike" kern="1200" cap="none" spc="0" normalizeH="0" baseline="0" noProof="0" smtClean="0">
+                <a:ln>
+                  <a:noFill/>
+                </a:ln>
+                <a:solidFill>
+                  <a:prstClr val="black">
+                    <a:lumMod val="50000"/>
+                    <a:lumOff val="50000"/>
+                  </a:prstClr>
+                </a:solidFill>
+                <a:effectLst/>
+                <a:uLnTx/>
+                <a:uFillTx/>
+                <a:latin typeface="Calibri" panose="020F0502020204030204"/>
+                <a:ea typeface="+mn-ea"/>
+                <a:cs typeface="+mn-cs"/>
+              </a:rPr>
+              <a:pPr marL="0" marR="0" lvl="0" indent="0" algn="r" defTabSz="914400" rtl="0" eaLnBrk="1" fontAlgn="auto" latinLnBrk="0" hangingPunct="1">
+                <a:lnSpc>
+                  <a:spcPct val="100000"/>
+                </a:lnSpc>
+                <a:spcBef>
+                  <a:spcPts val="0"/>
+                </a:spcBef>
+                <a:spcAft>
+                  <a:spcPts val="0"/>
+                </a:spcAft>
+                <a:buClrTx/>
+                <a:buSzTx/>
+                <a:buFontTx/>
+                <a:buNone/>
+                <a:tabLst/>
+                <a:defRPr/>
+              </a:pPr>
               <a:t>6</a:t>
             </a:fld>
-            <a:endParaRPr lang="en-US"/>
+            <a:endParaRPr kumimoji="0" lang="en-US" sz="1800" b="0" i="0" u="none" strike="noStrike" kern="1200" cap="none" spc="0" normalizeH="0" baseline="0" noProof="0">
+              <a:ln>
+                <a:noFill/>
+              </a:ln>
+              <a:solidFill>
+                <a:prstClr val="black">
+                  <a:lumMod val="50000"/>
+                  <a:lumOff val="50000"/>
+                </a:prstClr>
+              </a:solidFill>
+              <a:effectLst/>
+              <a:uLnTx/>
+              <a:uFillTx/>
+              <a:latin typeface="Calibri" panose="020F0502020204030204"/>
+              <a:ea typeface="+mn-ea"/>
+              <a:cs typeface="+mn-cs"/>
+            </a:endParaRPr>
           </a:p>
         </p:txBody>
       </p:sp>
@@ -7651,8 +8153,41 @@
           <a:bodyPr/>
           <a:lstStyle/>
           <a:p>
-            <a:r>
-              <a:rPr lang="en-CA" dirty="0"/>
+            <a:pPr marL="0" marR="0" lvl="0" indent="0" algn="l" defTabSz="914400" rtl="0" eaLnBrk="1" fontAlgn="auto" latinLnBrk="0" hangingPunct="1">
+              <a:lnSpc>
+                <a:spcPct val="100000"/>
+              </a:lnSpc>
+              <a:spcBef>
+                <a:spcPts val="0"/>
+              </a:spcBef>
+              <a:spcAft>
+                <a:spcPts val="0"/>
+              </a:spcAft>
+              <a:buClrTx/>
+              <a:buSzTx/>
+              <a:buFontTx/>
+              <a:buNone/>
+              <a:tabLst/>
+              <a:defRPr/>
+            </a:pPr>
+            <a:r>
+              <a:rPr kumimoji="0" lang="en-CA" sz="1800" b="0" i="0" u="none" strike="noStrike" kern="1200" cap="none" spc="0" normalizeH="0" baseline="0" noProof="0" dirty="0">
+                <a:ln>
+                  <a:noFill/>
+                </a:ln>
+                <a:solidFill>
+                  <a:prstClr val="black">
+                    <a:lumMod val="50000"/>
+                    <a:lumOff val="50000"/>
+                  </a:prstClr>
+                </a:solidFill>
+                <a:effectLst/>
+                <a:uLnTx/>
+                <a:uFillTx/>
+                <a:latin typeface="Calibri" panose="020F0502020204030204"/>
+                <a:ea typeface="+mn-ea"/>
+                <a:cs typeface="+mn-cs"/>
+              </a:rPr>
               <a:t>2024-09-26</a:t>
             </a:r>
           </a:p>
@@ -7661,7 +8196,7 @@
     </p:spTree>
     <p:extLst>
       <p:ext uri="{BB962C8B-B14F-4D97-AF65-F5344CB8AC3E}">
-        <p14:creationId xmlns:p14="http://schemas.microsoft.com/office/powerpoint/2010/main" val="2351600870"/>
+        <p14:creationId xmlns:p14="http://schemas.microsoft.com/office/powerpoint/2010/main" val="1388342694"/>
       </p:ext>
     </p:extLst>
   </p:cSld>
@@ -7693,6 +8228,261 @@
           <p:cNvPr id="2" name="Title 1">
             <a:extLst>
               <a:ext uri="{FF2B5EF4-FFF2-40B4-BE49-F238E27FC236}">
+                <a16:creationId xmlns:a16="http://schemas.microsoft.com/office/drawing/2014/main" id="{769E973D-CE91-F537-C36E-42E63A38EE3B}"/>
+              </a:ext>
+            </a:extLst>
+          </p:cNvPr>
+          <p:cNvSpPr>
+            <a:spLocks noGrp="1"/>
+          </p:cNvSpPr>
+          <p:nvPr>
+            <p:ph type="title"/>
+          </p:nvPr>
+        </p:nvSpPr>
+        <p:spPr/>
+        <p:txBody>
+          <a:bodyPr/>
+          <a:lstStyle/>
+          <a:p>
+            <a:r>
+              <a:rPr lang="en-CA" dirty="0"/>
+              <a:t>Requirements: Examples </a:t>
+            </a:r>
+          </a:p>
+        </p:txBody>
+      </p:sp>
+      <p:sp>
+        <p:nvSpPr>
+          <p:cNvPr id="3" name="Content Placeholder 2">
+            <a:extLst>
+              <a:ext uri="{FF2B5EF4-FFF2-40B4-BE49-F238E27FC236}">
+                <a16:creationId xmlns:a16="http://schemas.microsoft.com/office/drawing/2014/main" id="{D013F29C-27EF-B00F-BC36-D2551C84A203}"/>
+              </a:ext>
+            </a:extLst>
+          </p:cNvPr>
+          <p:cNvSpPr>
+            <a:spLocks noGrp="1"/>
+          </p:cNvSpPr>
+          <p:nvPr>
+            <p:ph idx="1"/>
+          </p:nvPr>
+        </p:nvSpPr>
+        <p:spPr/>
+        <p:txBody>
+          <a:bodyPr>
+            <a:normAutofit/>
+          </a:bodyPr>
+          <a:lstStyle/>
+          <a:p>
+            <a:pPr marL="0" indent="0">
+              <a:buNone/>
+            </a:pPr>
+            <a:r>
+              <a:rPr lang="en-CA" dirty="0"/>
+              <a:t>Based on </a:t>
+            </a:r>
+            <a:r>
+              <a:rPr lang="en-CA" dirty="0">
+                <a:hlinkClick r:id="rId2"/>
+              </a:rPr>
+              <a:t>https://github.com/w3c/wot-thing-description/issues/2039</a:t>
+            </a:r>
+            <a:endParaRPr lang="en-CA" dirty="0"/>
+          </a:p>
+          <a:p>
+            <a:r>
+              <a:rPr lang="en-CA" dirty="0"/>
+              <a:t>As a </a:t>
+            </a:r>
+            <a:r>
+              <a:rPr lang="en-CA" b="1" i="1" dirty="0"/>
+              <a:t>consumer of WoT TDs</a:t>
+            </a:r>
+            <a:r>
+              <a:rPr lang="en-CA" dirty="0"/>
+              <a:t>, </a:t>
+            </a:r>
+            <a:br>
+              <a:rPr lang="en-CA" dirty="0"/>
+            </a:br>
+            <a:r>
+              <a:rPr lang="en-CA" dirty="0"/>
+              <a:t>I want </a:t>
+            </a:r>
+            <a:r>
+              <a:rPr lang="en-CA" b="1" i="1" dirty="0"/>
+              <a:t>to know when or if writing a property returns a value</a:t>
+            </a:r>
+            <a:br>
+              <a:rPr lang="en-CA" dirty="0"/>
+            </a:br>
+            <a:r>
+              <a:rPr lang="en-CA" dirty="0"/>
+              <a:t>so that </a:t>
+            </a:r>
+            <a:r>
+              <a:rPr lang="en-CA" b="1" i="1" dirty="0"/>
+              <a:t>I can understand when I can use this value to confirm writes.</a:t>
+            </a:r>
+          </a:p>
+          <a:p>
+            <a:r>
+              <a:rPr lang="en-CA" dirty="0"/>
+              <a:t>As a </a:t>
+            </a:r>
+            <a:r>
+              <a:rPr lang="en-CA" b="1" i="1" dirty="0"/>
+              <a:t>producer of WoT TDs</a:t>
+            </a:r>
+            <a:r>
+              <a:rPr lang="en-CA" dirty="0"/>
+              <a:t>, </a:t>
+            </a:r>
+            <a:br>
+              <a:rPr lang="en-CA" dirty="0"/>
+            </a:br>
+            <a:r>
+              <a:rPr lang="en-CA" dirty="0"/>
+              <a:t>I want </a:t>
+            </a:r>
+            <a:r>
+              <a:rPr lang="en-CA" b="1" i="1" dirty="0"/>
+              <a:t>to be able to specify simple security schemes inline</a:t>
+            </a:r>
+            <a:br>
+              <a:rPr lang="en-CA" i="1" dirty="0"/>
+            </a:br>
+            <a:r>
+              <a:rPr lang="en-CA" dirty="0"/>
+              <a:t>so that </a:t>
+            </a:r>
+            <a:r>
+              <a:rPr lang="en-CA" b="1" i="1" dirty="0"/>
+              <a:t>TDs are less verbose and easier to write in simple cases.</a:t>
+            </a:r>
+          </a:p>
+        </p:txBody>
+      </p:sp>
+      <p:sp>
+        <p:nvSpPr>
+          <p:cNvPr id="4" name="Footer Placeholder 3">
+            <a:extLst>
+              <a:ext uri="{FF2B5EF4-FFF2-40B4-BE49-F238E27FC236}">
+                <a16:creationId xmlns:a16="http://schemas.microsoft.com/office/drawing/2014/main" id="{DA4CFF18-CB81-C769-6110-7D2674DA1D38}"/>
+              </a:ext>
+            </a:extLst>
+          </p:cNvPr>
+          <p:cNvSpPr>
+            <a:spLocks noGrp="1"/>
+          </p:cNvSpPr>
+          <p:nvPr>
+            <p:ph type="ftr" sz="quarter" idx="11"/>
+          </p:nvPr>
+        </p:nvSpPr>
+        <p:spPr/>
+        <p:txBody>
+          <a:bodyPr/>
+          <a:lstStyle/>
+          <a:p>
+            <a:r>
+              <a:rPr lang="en-US" dirty="0"/>
+              <a:t>W3C Web of Things (WoT) WG/IG – TPAC 2024</a:t>
+            </a:r>
+          </a:p>
+        </p:txBody>
+      </p:sp>
+      <p:sp>
+        <p:nvSpPr>
+          <p:cNvPr id="5" name="Slide Number Placeholder 4">
+            <a:extLst>
+              <a:ext uri="{FF2B5EF4-FFF2-40B4-BE49-F238E27FC236}">
+                <a16:creationId xmlns:a16="http://schemas.microsoft.com/office/drawing/2014/main" id="{79A95C01-BB2A-CD05-C1DE-85A40A68DCAE}"/>
+              </a:ext>
+            </a:extLst>
+          </p:cNvPr>
+          <p:cNvSpPr>
+            <a:spLocks noGrp="1"/>
+          </p:cNvSpPr>
+          <p:nvPr>
+            <p:ph type="sldNum" sz="quarter" idx="12"/>
+          </p:nvPr>
+        </p:nvSpPr>
+        <p:spPr/>
+        <p:txBody>
+          <a:bodyPr/>
+          <a:lstStyle/>
+          <a:p>
+            <a:fld id="{055BDE2E-7167-1944-9FEE-E44668D91CB6}" type="slidenum">
+              <a:rPr lang="en-US" smtClean="0"/>
+              <a:t>7</a:t>
+            </a:fld>
+            <a:endParaRPr lang="en-US"/>
+          </a:p>
+        </p:txBody>
+      </p:sp>
+      <p:sp>
+        <p:nvSpPr>
+          <p:cNvPr id="6" name="Date Placeholder 5">
+            <a:extLst>
+              <a:ext uri="{FF2B5EF4-FFF2-40B4-BE49-F238E27FC236}">
+                <a16:creationId xmlns:a16="http://schemas.microsoft.com/office/drawing/2014/main" id="{DF295013-68B0-18F5-660A-EF1F187929AE}"/>
+              </a:ext>
+            </a:extLst>
+          </p:cNvPr>
+          <p:cNvSpPr>
+            <a:spLocks noGrp="1"/>
+          </p:cNvSpPr>
+          <p:nvPr>
+            <p:ph type="dt" sz="half" idx="10"/>
+          </p:nvPr>
+        </p:nvSpPr>
+        <p:spPr/>
+        <p:txBody>
+          <a:bodyPr/>
+          <a:lstStyle/>
+          <a:p>
+            <a:r>
+              <a:rPr lang="en-CA" dirty="0"/>
+              <a:t>2024-09-26</a:t>
+            </a:r>
+          </a:p>
+        </p:txBody>
+      </p:sp>
+    </p:spTree>
+    <p:extLst>
+      <p:ext uri="{BB962C8B-B14F-4D97-AF65-F5344CB8AC3E}">
+        <p14:creationId xmlns:p14="http://schemas.microsoft.com/office/powerpoint/2010/main" val="2351600870"/>
+      </p:ext>
+    </p:extLst>
+  </p:cSld>
+  <p:clrMapOvr>
+    <a:masterClrMapping/>
+  </p:clrMapOvr>
+</p:sld>
+</file>
+
+<file path=ppt/slides/slide8.xml><?xml version="1.0" encoding="utf-8"?>
+<p:sld xmlns:a="http://schemas.openxmlformats.org/drawingml/2006/main" xmlns:r="http://schemas.openxmlformats.org/officeDocument/2006/relationships" xmlns:p="http://schemas.openxmlformats.org/presentationml/2006/main">
+  <p:cSld>
+    <p:spTree>
+      <p:nvGrpSpPr>
+        <p:cNvPr id="1" name=""/>
+        <p:cNvGrpSpPr/>
+        <p:nvPr/>
+      </p:nvGrpSpPr>
+      <p:grpSpPr>
+        <a:xfrm>
+          <a:off x="0" y="0"/>
+          <a:ext cx="0" cy="0"/>
+          <a:chOff x="0" y="0"/>
+          <a:chExt cx="0" cy="0"/>
+        </a:xfrm>
+      </p:grpSpPr>
+      <p:sp>
+        <p:nvSpPr>
+          <p:cNvPr id="2" name="Title 1">
+            <a:extLst>
+              <a:ext uri="{FF2B5EF4-FFF2-40B4-BE49-F238E27FC236}">
                 <a16:creationId xmlns:a16="http://schemas.microsoft.com/office/drawing/2014/main" id="{CA69588A-E604-DC85-2066-D7B5C1DC2F29}"/>
               </a:ext>
             </a:extLst>
@@ -7774,7 +8564,7 @@
           <a:p>
             <a:fld id="{055BDE2E-7167-1944-9FEE-E44668D91CB6}" type="slidenum">
               <a:rPr lang="en-US" smtClean="0"/>
-              <a:t>7</a:t>
+              <a:t>8</a:t>
             </a:fld>
             <a:endParaRPr lang="en-US"/>
           </a:p>
@@ -8710,241 +9500,6 @@
 </p:sld>
 </file>
 
-<file path=ppt/slides/slide8.xml><?xml version="1.0" encoding="utf-8"?>
-<p:sld xmlns:a="http://schemas.openxmlformats.org/drawingml/2006/main" xmlns:r="http://schemas.openxmlformats.org/officeDocument/2006/relationships" xmlns:p="http://schemas.openxmlformats.org/presentationml/2006/main">
-  <p:cSld>
-    <p:spTree>
-      <p:nvGrpSpPr>
-        <p:cNvPr id="1" name=""/>
-        <p:cNvGrpSpPr/>
-        <p:nvPr/>
-      </p:nvGrpSpPr>
-      <p:grpSpPr>
-        <a:xfrm>
-          <a:off x="0" y="0"/>
-          <a:ext cx="0" cy="0"/>
-          <a:chOff x="0" y="0"/>
-          <a:chExt cx="0" cy="0"/>
-        </a:xfrm>
-      </p:grpSpPr>
-      <p:sp>
-        <p:nvSpPr>
-          <p:cNvPr id="2" name="Title 1">
-            <a:extLst>
-              <a:ext uri="{FF2B5EF4-FFF2-40B4-BE49-F238E27FC236}">
-                <a16:creationId xmlns:a16="http://schemas.microsoft.com/office/drawing/2014/main" id="{F46009AE-FC79-9D2D-61EF-2A0C08E7AE7D}"/>
-              </a:ext>
-            </a:extLst>
-          </p:cNvPr>
-          <p:cNvSpPr>
-            <a:spLocks noGrp="1"/>
-          </p:cNvSpPr>
-          <p:nvPr>
-            <p:ph type="title"/>
-          </p:nvPr>
-        </p:nvSpPr>
-        <p:spPr/>
-        <p:txBody>
-          <a:bodyPr/>
-          <a:lstStyle/>
-          <a:p>
-            <a:r>
-              <a:rPr lang="en-CA" dirty="0"/>
-              <a:t>Categories</a:t>
-            </a:r>
-            <a:endParaRPr lang="en-US" dirty="0"/>
-          </a:p>
-        </p:txBody>
-      </p:sp>
-      <p:sp>
-        <p:nvSpPr>
-          <p:cNvPr id="3" name="Content Placeholder 2">
-            <a:extLst>
-              <a:ext uri="{FF2B5EF4-FFF2-40B4-BE49-F238E27FC236}">
-                <a16:creationId xmlns:a16="http://schemas.microsoft.com/office/drawing/2014/main" id="{F54CD475-00EA-85CF-318A-DD9C80F09357}"/>
-              </a:ext>
-            </a:extLst>
-          </p:cNvPr>
-          <p:cNvSpPr>
-            <a:spLocks noGrp="1"/>
-          </p:cNvSpPr>
-          <p:nvPr>
-            <p:ph idx="1"/>
-          </p:nvPr>
-        </p:nvSpPr>
-        <p:spPr/>
-        <p:txBody>
-          <a:bodyPr/>
-          <a:lstStyle/>
-          <a:p>
-            <a:r>
-              <a:rPr lang="en-CA" dirty="0"/>
-              <a:t>Intermediate step but allows for generalization</a:t>
-            </a:r>
-          </a:p>
-          <a:p>
-            <a:pPr lvl="1"/>
-            <a:r>
-              <a:rPr lang="en-CA" dirty="0"/>
-              <a:t>Avoids having to constantly update “requirement” to “use case” mapping</a:t>
-            </a:r>
-          </a:p>
-          <a:p>
-            <a:pPr lvl="1"/>
-            <a:r>
-              <a:rPr lang="en-CA" b="1" i="1" dirty="0"/>
-              <a:t>JUST A CONVENIENCE </a:t>
-            </a:r>
-            <a:r>
-              <a:rPr lang="en-CA" dirty="0"/>
-              <a:t>when many use cases share common requirements</a:t>
-            </a:r>
-          </a:p>
-          <a:p>
-            <a:pPr marL="0" indent="0">
-              <a:buNone/>
-            </a:pPr>
-            <a:r>
-              <a:rPr lang="en-CA" dirty="0"/>
-              <a:t>Some possible categories:</a:t>
-            </a:r>
-          </a:p>
-          <a:p>
-            <a:r>
-              <a:rPr lang="en-CA" dirty="0"/>
-              <a:t>Private (handles personal or confidential information)</a:t>
-            </a:r>
-          </a:p>
-          <a:p>
-            <a:r>
-              <a:rPr lang="en-CA" dirty="0"/>
-              <a:t>Flexible Protocol Usage (systems use multiple protocols)</a:t>
-            </a:r>
-          </a:p>
-          <a:p>
-            <a:r>
-              <a:rPr lang="en-CA" dirty="0"/>
-              <a:t>Cloud Integration (needs to share data with remote servers)</a:t>
-            </a:r>
-          </a:p>
-          <a:p>
-            <a:r>
-              <a:rPr lang="en-CA" dirty="0"/>
-              <a:t>Local Access (needs to operate without a global connection)</a:t>
-            </a:r>
-          </a:p>
-          <a:p>
-            <a:r>
-              <a:rPr lang="en-CA" dirty="0"/>
-              <a:t>Mobile (location is subject to change)</a:t>
-            </a:r>
-          </a:p>
-          <a:p>
-            <a:r>
-              <a:rPr lang="en-CA" dirty="0"/>
-              <a:t>Resiliency (needs to be robust to failures and attacks of various kinds)</a:t>
-            </a:r>
-          </a:p>
-        </p:txBody>
-      </p:sp>
-      <p:sp>
-        <p:nvSpPr>
-          <p:cNvPr id="4" name="Footer Placeholder 3">
-            <a:extLst>
-              <a:ext uri="{FF2B5EF4-FFF2-40B4-BE49-F238E27FC236}">
-                <a16:creationId xmlns:a16="http://schemas.microsoft.com/office/drawing/2014/main" id="{FC0324D6-CCAD-24D7-9788-A5224D187440}"/>
-              </a:ext>
-            </a:extLst>
-          </p:cNvPr>
-          <p:cNvSpPr>
-            <a:spLocks noGrp="1"/>
-          </p:cNvSpPr>
-          <p:nvPr>
-            <p:ph type="ftr" sz="quarter" idx="11"/>
-          </p:nvPr>
-        </p:nvSpPr>
-        <p:spPr/>
-        <p:txBody>
-          <a:bodyPr/>
-          <a:lstStyle/>
-          <a:p>
-            <a:r>
-              <a:rPr lang="en-US" dirty="0"/>
-              <a:t>W3C Web of Things (WoT) WG/IG – TPAC 2024</a:t>
-            </a:r>
-          </a:p>
-        </p:txBody>
-      </p:sp>
-      <p:sp>
-        <p:nvSpPr>
-          <p:cNvPr id="5" name="Slide Number Placeholder 4">
-            <a:extLst>
-              <a:ext uri="{FF2B5EF4-FFF2-40B4-BE49-F238E27FC236}">
-                <a16:creationId xmlns:a16="http://schemas.microsoft.com/office/drawing/2014/main" id="{5A3C13F2-8181-81B2-4822-21E8A07DAD75}"/>
-              </a:ext>
-            </a:extLst>
-          </p:cNvPr>
-          <p:cNvSpPr>
-            <a:spLocks noGrp="1"/>
-          </p:cNvSpPr>
-          <p:nvPr>
-            <p:ph type="sldNum" sz="quarter" idx="12"/>
-          </p:nvPr>
-        </p:nvSpPr>
-        <p:spPr/>
-        <p:txBody>
-          <a:bodyPr/>
-          <a:lstStyle/>
-          <a:p>
-            <a:fld id="{055BDE2E-7167-1944-9FEE-E44668D91CB6}" type="slidenum">
-              <a:rPr lang="en-US" smtClean="0"/>
-              <a:t>8</a:t>
-            </a:fld>
-            <a:endParaRPr lang="en-US"/>
-          </a:p>
-        </p:txBody>
-      </p:sp>
-      <p:sp>
-        <p:nvSpPr>
-          <p:cNvPr id="6" name="Date Placeholder 5">
-            <a:extLst>
-              <a:ext uri="{FF2B5EF4-FFF2-40B4-BE49-F238E27FC236}">
-                <a16:creationId xmlns:a16="http://schemas.microsoft.com/office/drawing/2014/main" id="{A36BA347-3135-66B1-99D6-45003D29F880}"/>
-              </a:ext>
-            </a:extLst>
-          </p:cNvPr>
-          <p:cNvSpPr>
-            <a:spLocks noGrp="1"/>
-          </p:cNvSpPr>
-          <p:nvPr>
-            <p:ph type="dt" sz="half" idx="10"/>
-          </p:nvPr>
-        </p:nvSpPr>
-        <p:spPr/>
-        <p:txBody>
-          <a:bodyPr/>
-          <a:lstStyle/>
-          <a:p>
-            <a:r>
-              <a:rPr lang="en-US" dirty="0"/>
-              <a:t>2024-09-26</a:t>
-            </a:r>
-          </a:p>
-        </p:txBody>
-      </p:sp>
-    </p:spTree>
-    <p:extLst>
-      <p:ext uri="{BB962C8B-B14F-4D97-AF65-F5344CB8AC3E}">
-        <p14:creationId xmlns:p14="http://schemas.microsoft.com/office/powerpoint/2010/main" val="868142888"/>
-      </p:ext>
-    </p:extLst>
-  </p:cSld>
-  <p:clrMapOvr>
-    <a:masterClrMapping/>
-  </p:clrMapOvr>
-</p:sld>
-</file>
-
 <file path=ppt/slides/slide9.xml><?xml version="1.0" encoding="utf-8"?>
 <p:sld xmlns:a="http://schemas.openxmlformats.org/drawingml/2006/main" xmlns:r="http://schemas.openxmlformats.org/officeDocument/2006/relationships" xmlns:p="http://schemas.openxmlformats.org/presentationml/2006/main">
   <p:cSld>
@@ -8967,7 +9522,7 @@
           <p:cNvPr id="2" name="Title 1">
             <a:extLst>
               <a:ext uri="{FF2B5EF4-FFF2-40B4-BE49-F238E27FC236}">
-                <a16:creationId xmlns:a16="http://schemas.microsoft.com/office/drawing/2014/main" id="{F6BE134B-66C4-1D89-1049-4EF2CFB07ED3}"/>
+                <a16:creationId xmlns:a16="http://schemas.microsoft.com/office/drawing/2014/main" id="{F46009AE-FC79-9D2D-61EF-2A0C08E7AE7D}"/>
               </a:ext>
             </a:extLst>
           </p:cNvPr>
@@ -8984,9 +9539,10 @@
           <a:lstStyle/>
           <a:p>
             <a:r>
-              <a:rPr lang="en-US" dirty="0"/>
-              <a:t>Security and Privacy Requirements</a:t>
-            </a:r>
+              <a:rPr lang="en-CA" dirty="0"/>
+              <a:t>Categories</a:t>
+            </a:r>
+            <a:endParaRPr lang="en-US" dirty="0"/>
           </a:p>
         </p:txBody>
       </p:sp>
@@ -8995,7 +9551,7 @@
           <p:cNvPr id="3" name="Content Placeholder 2">
             <a:extLst>
               <a:ext uri="{FF2B5EF4-FFF2-40B4-BE49-F238E27FC236}">
-                <a16:creationId xmlns:a16="http://schemas.microsoft.com/office/drawing/2014/main" id="{E1C9EC77-521A-A3BD-492F-9365062B6645}"/>
+                <a16:creationId xmlns:a16="http://schemas.microsoft.com/office/drawing/2014/main" id="{F54CD475-00EA-85CF-318A-DD9C80F09357}"/>
               </a:ext>
             </a:extLst>
           </p:cNvPr>
@@ -9010,52 +9566,81 @@
         <p:txBody>
           <a:bodyPr/>
           <a:lstStyle/>
+          <a:p>
+            <a:r>
+              <a:rPr lang="en-CA" dirty="0"/>
+              <a:t>Intermediate, </a:t>
+            </a:r>
+            <a:r>
+              <a:rPr lang="en-CA" i="1" dirty="0"/>
+              <a:t>optional</a:t>
+            </a:r>
+            <a:r>
+              <a:rPr lang="en-CA" dirty="0"/>
+              <a:t> step but allows for generalization</a:t>
+            </a:r>
+          </a:p>
+          <a:p>
+            <a:pPr lvl="1"/>
+            <a:r>
+              <a:rPr lang="en-CA" dirty="0"/>
+              <a:t>Avoids having to constantly update “requirement” to “use case” mapping</a:t>
+            </a:r>
+          </a:p>
+          <a:p>
+            <a:pPr lvl="1"/>
+            <a:r>
+              <a:rPr lang="en-CA" b="1" i="1" dirty="0"/>
+              <a:t>JUST A CONVENIENCE </a:t>
+            </a:r>
+            <a:r>
+              <a:rPr lang="en-CA" dirty="0"/>
+              <a:t>when many use cases share common requirements</a:t>
+            </a:r>
+          </a:p>
           <a:p>
             <a:pPr marL="0" indent="0">
               <a:buNone/>
             </a:pPr>
             <a:r>
-              <a:rPr lang="en-US" b="1" dirty="0"/>
-              <a:t>Special case:</a:t>
-            </a:r>
-          </a:p>
-          <a:p>
-            <a:r>
-              <a:rPr lang="en-US" dirty="0"/>
-              <a:t>Security/Privacy features are generally to mitigate “risks”</a:t>
-            </a:r>
-          </a:p>
-          <a:p>
-            <a:pPr lvl="1"/>
-            <a:r>
-              <a:rPr lang="en-US" dirty="0"/>
-              <a:t>S&amp;P sections generally each have a defined risk</a:t>
-            </a:r>
-          </a:p>
-          <a:p>
-            <a:pPr lvl="1"/>
-            <a:r>
-              <a:rPr lang="en-US" dirty="0"/>
-              <a:t>… then mitigations, some of which may be normative</a:t>
-            </a:r>
-          </a:p>
-          <a:p>
-            <a:r>
-              <a:rPr lang="en-US" dirty="0"/>
-              <a:t>Risks are documented in “Security and Privacy Guidelines” document</a:t>
-            </a:r>
-          </a:p>
-          <a:p>
-            <a:pPr lvl="1"/>
-            <a:r>
-              <a:rPr lang="en-US" dirty="0"/>
-              <a:t>Stakeholders need to be made consistent with other documents</a:t>
-            </a:r>
-          </a:p>
-          <a:p>
-            <a:r>
-              <a:rPr lang="en-US" b="1" i="1" dirty="0"/>
-              <a:t>Need to identify which use cases have which risks</a:t>
+              <a:rPr lang="en-CA" dirty="0"/>
+              <a:t>Some possible categories:</a:t>
+            </a:r>
+          </a:p>
+          <a:p>
+            <a:r>
+              <a:rPr lang="en-CA" dirty="0"/>
+              <a:t>Private (handles personal or confidential information)</a:t>
+            </a:r>
+          </a:p>
+          <a:p>
+            <a:r>
+              <a:rPr lang="en-CA" dirty="0"/>
+              <a:t>Flexible Protocol Usage (use multiple protocols)</a:t>
+            </a:r>
+          </a:p>
+          <a:p>
+            <a:r>
+              <a:rPr lang="en-CA" dirty="0"/>
+              <a:t>Cloud Integration (shares data with remote servers)</a:t>
+            </a:r>
+          </a:p>
+          <a:p>
+            <a:r>
+              <a:rPr lang="en-CA" dirty="0"/>
+              <a:t>Local Access (needs to operate without a global connection)</a:t>
+            </a:r>
+          </a:p>
+          <a:p>
+            <a:r>
+              <a:rPr lang="en-CA" dirty="0"/>
+              <a:t>Mobile (location is subject to change)</a:t>
+            </a:r>
+          </a:p>
+          <a:p>
+            <a:r>
+              <a:rPr lang="en-CA" dirty="0"/>
+              <a:t>Resiliency (needs to be robust to failures and attacks of various kinds)</a:t>
             </a:r>
           </a:p>
         </p:txBody>
@@ -9065,7 +9650,7 @@
           <p:cNvPr id="4" name="Footer Placeholder 3">
             <a:extLst>
               <a:ext uri="{FF2B5EF4-FFF2-40B4-BE49-F238E27FC236}">
-                <a16:creationId xmlns:a16="http://schemas.microsoft.com/office/drawing/2014/main" id="{8EC9F71E-D9A0-1887-F7E3-880607CCFD88}"/>
+                <a16:creationId xmlns:a16="http://schemas.microsoft.com/office/drawing/2014/main" id="{FC0324D6-CCAD-24D7-9788-A5224D187440}"/>
               </a:ext>
             </a:extLst>
           </p:cNvPr>
@@ -9093,7 +9678,7 @@
           <p:cNvPr id="5" name="Slide Number Placeholder 4">
             <a:extLst>
               <a:ext uri="{FF2B5EF4-FFF2-40B4-BE49-F238E27FC236}">
-                <a16:creationId xmlns:a16="http://schemas.microsoft.com/office/drawing/2014/main" id="{F6D66143-2605-6E52-90A1-373D4AF392EC}"/>
+                <a16:creationId xmlns:a16="http://schemas.microsoft.com/office/drawing/2014/main" id="{5A3C13F2-8181-81B2-4822-21E8A07DAD75}"/>
               </a:ext>
             </a:extLst>
           </p:cNvPr>
@@ -9122,7 +9707,7 @@
           <p:cNvPr id="6" name="Date Placeholder 5">
             <a:extLst>
               <a:ext uri="{FF2B5EF4-FFF2-40B4-BE49-F238E27FC236}">
-                <a16:creationId xmlns:a16="http://schemas.microsoft.com/office/drawing/2014/main" id="{0884D1E5-BEEA-BC78-5C89-F302C72FA45A}"/>
+                <a16:creationId xmlns:a16="http://schemas.microsoft.com/office/drawing/2014/main" id="{A36BA347-3135-66B1-99D6-45003D29F880}"/>
               </a:ext>
             </a:extLst>
           </p:cNvPr>
@@ -9148,7 +9733,7 @@
     </p:spTree>
     <p:extLst>
       <p:ext uri="{BB962C8B-B14F-4D97-AF65-F5344CB8AC3E}">
-        <p14:creationId xmlns:p14="http://schemas.microsoft.com/office/powerpoint/2010/main" val="1516491476"/>
+        <p14:creationId xmlns:p14="http://schemas.microsoft.com/office/powerpoint/2010/main" val="868142888"/>
       </p:ext>
     </p:extLst>
   </p:cSld>

</xml_diff>